<commit_message>
fix PPTX & PDF
</commit_message>
<xml_diff>
--- a/08_events.pptx
+++ b/08_events.pptx
@@ -257,7 +257,7 @@
             <a:fld id="{85522811-C5C6-42D2-A409-F8556720C93F}" type="datetimeFigureOut">
               <a:rPr lang="uk-UA" smtClean="0"/>
               <a:pPr/>
-              <a:t>27.11.2018</a:t>
+              <a:t>01.12.2018</a:t>
             </a:fld>
             <a:endParaRPr lang="uk-UA"/>
           </a:p>
@@ -792,7 +792,7 @@
             <a:fld id="{E6FC6B0D-6115-4D7C-8040-9C8E2349BB6E}" type="datetime1">
               <a:rPr lang="uk-UA" smtClean="0"/>
               <a:pPr/>
-              <a:t>27.11.2018</a:t>
+              <a:t>01.12.2018</a:t>
             </a:fld>
             <a:endParaRPr lang="uk-UA"/>
           </a:p>
@@ -959,7 +959,7 @@
             <a:fld id="{996367BA-0A39-4DE2-BFC3-D5290044365E}" type="datetime1">
               <a:rPr lang="uk-UA" smtClean="0"/>
               <a:pPr/>
-              <a:t>27.11.2018</a:t>
+              <a:t>01.12.2018</a:t>
             </a:fld>
             <a:endParaRPr lang="uk-UA"/>
           </a:p>
@@ -1136,7 +1136,7 @@
             <a:fld id="{1BD6A67F-6C29-47DC-AF8A-FDB3C787DF70}" type="datetime1">
               <a:rPr lang="uk-UA" smtClean="0"/>
               <a:pPr/>
-              <a:t>27.11.2018</a:t>
+              <a:t>01.12.2018</a:t>
             </a:fld>
             <a:endParaRPr lang="uk-UA"/>
           </a:p>
@@ -1303,7 +1303,7 @@
             <a:fld id="{1657D9C5-7FF1-434F-B56E-9BAD559744E9}" type="datetime1">
               <a:rPr lang="uk-UA" smtClean="0"/>
               <a:pPr/>
-              <a:t>27.11.2018</a:t>
+              <a:t>01.12.2018</a:t>
             </a:fld>
             <a:endParaRPr lang="uk-UA"/>
           </a:p>
@@ -1546,7 +1546,7 @@
             <a:fld id="{2CEB0FC9-DE63-476B-A1A9-BE934D9049F8}" type="datetime1">
               <a:rPr lang="uk-UA" smtClean="0"/>
               <a:pPr/>
-              <a:t>27.11.2018</a:t>
+              <a:t>01.12.2018</a:t>
             </a:fld>
             <a:endParaRPr lang="uk-UA"/>
           </a:p>
@@ -1831,7 +1831,7 @@
             <a:fld id="{F964460F-86E2-4DF6-9D0F-12F5005CF375}" type="datetime1">
               <a:rPr lang="uk-UA" smtClean="0"/>
               <a:pPr/>
-              <a:t>27.11.2018</a:t>
+              <a:t>01.12.2018</a:t>
             </a:fld>
             <a:endParaRPr lang="uk-UA"/>
           </a:p>
@@ -2250,7 +2250,7 @@
             <a:fld id="{C521715E-DDCD-4267-B0A5-2918B6F6768A}" type="datetime1">
               <a:rPr lang="uk-UA" smtClean="0"/>
               <a:pPr/>
-              <a:t>27.11.2018</a:t>
+              <a:t>01.12.2018</a:t>
             </a:fld>
             <a:endParaRPr lang="uk-UA"/>
           </a:p>
@@ -2365,7 +2365,7 @@
             <a:fld id="{9289842C-EB2D-4EBB-A272-2F6A49D9794D}" type="datetime1">
               <a:rPr lang="uk-UA" smtClean="0"/>
               <a:pPr/>
-              <a:t>27.11.2018</a:t>
+              <a:t>01.12.2018</a:t>
             </a:fld>
             <a:endParaRPr lang="uk-UA"/>
           </a:p>
@@ -2457,7 +2457,7 @@
             <a:fld id="{D036F091-B700-4B52-99AC-85D0FD94D904}" type="datetime1">
               <a:rPr lang="uk-UA" smtClean="0"/>
               <a:pPr/>
-              <a:t>27.11.2018</a:t>
+              <a:t>01.12.2018</a:t>
             </a:fld>
             <a:endParaRPr lang="uk-UA"/>
           </a:p>
@@ -2731,7 +2731,7 @@
             <a:fld id="{B35DFABA-3811-4634-B803-2EAC4CD0063B}" type="datetime1">
               <a:rPr lang="uk-UA" smtClean="0"/>
               <a:pPr/>
-              <a:t>27.11.2018</a:t>
+              <a:t>01.12.2018</a:t>
             </a:fld>
             <a:endParaRPr lang="uk-UA"/>
           </a:p>
@@ -2981,7 +2981,7 @@
             <a:fld id="{8A9EA25E-F88E-463A-A119-D1E55A881002}" type="datetime1">
               <a:rPr lang="uk-UA" smtClean="0"/>
               <a:pPr/>
-              <a:t>27.11.2018</a:t>
+              <a:t>01.12.2018</a:t>
             </a:fld>
             <a:endParaRPr lang="uk-UA"/>
           </a:p>
@@ -3191,7 +3191,7 @@
             <a:fld id="{E708ED03-0080-49A2-B709-7DA4ACB3A1C3}" type="datetime1">
               <a:rPr lang="uk-UA" smtClean="0"/>
               <a:pPr/>
-              <a:t>27.11.2018</a:t>
+              <a:t>01.12.2018</a:t>
             </a:fld>
             <a:endParaRPr lang="uk-UA"/>
           </a:p>
@@ -11573,15 +11573,7 @@
                   <a:srgbClr val="0070C0"/>
                 </a:solidFill>
               </a:rPr>
-              <a:t>./</a:t>
-            </a:r>
-            <a:r>
-              <a:rPr lang="en-US" sz="2400" b="1" dirty="0" smtClean="0">
-                <a:solidFill>
-                  <a:srgbClr val="0070C0"/>
-                </a:solidFill>
-              </a:rPr>
-              <a:t>source/ex02.html</a:t>
+              <a:t>./source/ex02.html</a:t>
             </a:r>
             <a:endParaRPr lang="ru-RU" sz="2400" b="1" dirty="0">
               <a:solidFill>
@@ -13242,8 +13234,8 @@
         </p:nvSpPr>
         <p:spPr>
           <a:xfrm>
-            <a:off x="4283997" y="44625"/>
-            <a:ext cx="3696012" cy="584775"/>
+            <a:off x="3863752" y="44625"/>
+            <a:ext cx="4572855" cy="584775"/>
           </a:xfrm>
           <a:prstGeom prst="rect">
             <a:avLst/>
@@ -13258,8 +13250,21 @@
           <a:p>
             <a:r>
               <a:rPr lang="ru-RU" sz="3200" b="1" dirty="0"/>
-              <a:t>Домашнее задание</a:t>
-            </a:r>
+              <a:t>Домашнее </a:t>
+            </a:r>
+            <a:r>
+              <a:rPr lang="ru-RU" sz="3200" b="1" dirty="0" smtClean="0"/>
+              <a:t>задание</a:t>
+            </a:r>
+            <a:r>
+              <a:rPr lang="en-US" sz="3200" b="1" dirty="0"/>
+              <a:t> </a:t>
+            </a:r>
+            <a:r>
+              <a:rPr lang="en-US" sz="3200" b="1" dirty="0" smtClean="0"/>
+              <a:t>#G.1</a:t>
+            </a:r>
+            <a:endParaRPr lang="ru-RU" sz="3200" b="1" dirty="0"/>
           </a:p>
         </p:txBody>
       </p:sp>

</xml_diff>